<commit_message>
updated documentation + new screencast
removed layoutparams for buttons in guessactivity, caused really small
buttons
</commit_message>
<xml_diff>
--- a/Guess the movie!.pptx
+++ b/Guess the movie!.pptx
@@ -331,7 +331,7 @@
             <a:fld id="{B61BEF0D-F0BB-DE4B-95CE-6DB70DBA9567}" type="datetimeFigureOut">
               <a:rPr lang="en-US" dirty="0"/>
               <a:pPr/>
-              <a:t>30-Nov-15</a:t>
+              <a:t>02-Dec-15</a:t>
             </a:fld>
             <a:endParaRPr lang="en-US" dirty="0"/>
           </a:p>
@@ -619,7 +619,7 @@
             <a:fld id="{B61BEF0D-F0BB-DE4B-95CE-6DB70DBA9567}" type="datetimeFigureOut">
               <a:rPr lang="en-US" dirty="0"/>
               <a:pPr/>
-              <a:t>30-Nov-15</a:t>
+              <a:t>02-Dec-15</a:t>
             </a:fld>
             <a:endParaRPr lang="en-US" dirty="0"/>
           </a:p>
@@ -875,7 +875,7 @@
             <a:fld id="{B61BEF0D-F0BB-DE4B-95CE-6DB70DBA9567}" type="datetimeFigureOut">
               <a:rPr lang="en-US" dirty="0"/>
               <a:pPr/>
-              <a:t>30-Nov-15</a:t>
+              <a:t>02-Dec-15</a:t>
             </a:fld>
             <a:endParaRPr lang="en-US" dirty="0"/>
           </a:p>
@@ -1341,7 +1341,7 @@
             <a:fld id="{B61BEF0D-F0BB-DE4B-95CE-6DB70DBA9567}" type="datetimeFigureOut">
               <a:rPr lang="en-US" dirty="0"/>
               <a:pPr/>
-              <a:t>30-Nov-15</a:t>
+              <a:t>02-Dec-15</a:t>
             </a:fld>
             <a:endParaRPr lang="en-US" dirty="0"/>
           </a:p>
@@ -1518,7 +1518,7 @@
             <a:fld id="{B61BEF0D-F0BB-DE4B-95CE-6DB70DBA9567}" type="datetimeFigureOut">
               <a:rPr lang="en-US" dirty="0"/>
               <a:pPr/>
-              <a:t>30-Nov-15</a:t>
+              <a:t>02-Dec-15</a:t>
             </a:fld>
             <a:endParaRPr lang="en-US" dirty="0"/>
           </a:p>
@@ -2091,7 +2091,7 @@
             <a:fld id="{B61BEF0D-F0BB-DE4B-95CE-6DB70DBA9567}" type="datetimeFigureOut">
               <a:rPr lang="en-US" dirty="0"/>
               <a:pPr/>
-              <a:t>30-Nov-15</a:t>
+              <a:t>02-Dec-15</a:t>
             </a:fld>
             <a:endParaRPr lang="en-US" dirty="0"/>
           </a:p>
@@ -2420,7 +2420,7 @@
             <a:fld id="{B61BEF0D-F0BB-DE4B-95CE-6DB70DBA9567}" type="datetimeFigureOut">
               <a:rPr lang="en-US" dirty="0"/>
               <a:pPr/>
-              <a:t>30-Nov-15</a:t>
+              <a:t>02-Dec-15</a:t>
             </a:fld>
             <a:endParaRPr lang="en-US" dirty="0"/>
           </a:p>
@@ -2592,7 +2592,7 @@
             <a:fld id="{B61BEF0D-F0BB-DE4B-95CE-6DB70DBA9567}" type="datetimeFigureOut">
               <a:rPr lang="en-US" dirty="0"/>
               <a:pPr/>
-              <a:t>30-Nov-15</a:t>
+              <a:t>02-Dec-15</a:t>
             </a:fld>
             <a:endParaRPr lang="en-US" dirty="0"/>
           </a:p>
@@ -2769,7 +2769,7 @@
             <a:fld id="{B61BEF0D-F0BB-DE4B-95CE-6DB70DBA9567}" type="datetimeFigureOut">
               <a:rPr lang="en-US" dirty="0"/>
               <a:pPr/>
-              <a:t>30-Nov-15</a:t>
+              <a:t>02-Dec-15</a:t>
             </a:fld>
             <a:endParaRPr lang="en-US" dirty="0"/>
           </a:p>
@@ -2936,7 +2936,7 @@
             <a:fld id="{B61BEF0D-F0BB-DE4B-95CE-6DB70DBA9567}" type="datetimeFigureOut">
               <a:rPr lang="en-US" dirty="0"/>
               <a:pPr/>
-              <a:t>30-Nov-15</a:t>
+              <a:t>02-Dec-15</a:t>
             </a:fld>
             <a:endParaRPr lang="en-US" dirty="0"/>
           </a:p>
@@ -3190,7 +3190,7 @@
             <a:fld id="{B61BEF0D-F0BB-DE4B-95CE-6DB70DBA9567}" type="datetimeFigureOut">
               <a:rPr lang="en-US" dirty="0"/>
               <a:pPr/>
-              <a:t>30-Nov-15</a:t>
+              <a:t>02-Dec-15</a:t>
             </a:fld>
             <a:endParaRPr lang="en-US" dirty="0"/>
           </a:p>
@@ -3479,7 +3479,7 @@
             <a:fld id="{B61BEF0D-F0BB-DE4B-95CE-6DB70DBA9567}" type="datetimeFigureOut">
               <a:rPr lang="en-US" dirty="0"/>
               <a:pPr/>
-              <a:t>30-Nov-15</a:t>
+              <a:t>02-Dec-15</a:t>
             </a:fld>
             <a:endParaRPr lang="en-US" dirty="0"/>
           </a:p>
@@ -3906,7 +3906,7 @@
             <a:fld id="{B61BEF0D-F0BB-DE4B-95CE-6DB70DBA9567}" type="datetimeFigureOut">
               <a:rPr lang="en-US" dirty="0"/>
               <a:pPr/>
-              <a:t>30-Nov-15</a:t>
+              <a:t>02-Dec-15</a:t>
             </a:fld>
             <a:endParaRPr lang="en-US" dirty="0"/>
           </a:p>
@@ -4021,7 +4021,7 @@
             <a:fld id="{B61BEF0D-F0BB-DE4B-95CE-6DB70DBA9567}" type="datetimeFigureOut">
               <a:rPr lang="en-US" dirty="0"/>
               <a:pPr/>
-              <a:t>30-Nov-15</a:t>
+              <a:t>02-Dec-15</a:t>
             </a:fld>
             <a:endParaRPr lang="en-US" dirty="0"/>
           </a:p>
@@ -4113,7 +4113,7 @@
             <a:fld id="{B61BEF0D-F0BB-DE4B-95CE-6DB70DBA9567}" type="datetimeFigureOut">
               <a:rPr lang="en-US" dirty="0"/>
               <a:pPr/>
-              <a:t>30-Nov-15</a:t>
+              <a:t>02-Dec-15</a:t>
             </a:fld>
             <a:endParaRPr lang="en-US" dirty="0"/>
           </a:p>
@@ -4393,7 +4393,7 @@
             <a:fld id="{B61BEF0D-F0BB-DE4B-95CE-6DB70DBA9567}" type="datetimeFigureOut">
               <a:rPr lang="en-US" dirty="0"/>
               <a:pPr/>
-              <a:t>30-Nov-15</a:t>
+              <a:t>02-Dec-15</a:t>
             </a:fld>
             <a:endParaRPr lang="en-US" dirty="0"/>
           </a:p>
@@ -4681,7 +4681,7 @@
             <a:fld id="{B61BEF0D-F0BB-DE4B-95CE-6DB70DBA9567}" type="datetimeFigureOut">
               <a:rPr lang="en-US" dirty="0"/>
               <a:pPr/>
-              <a:t>30-Nov-15</a:t>
+              <a:t>02-Dec-15</a:t>
             </a:fld>
             <a:endParaRPr lang="en-US" dirty="0"/>
           </a:p>
@@ -4909,7 +4909,7 @@
             <a:fld id="{B61BEF0D-F0BB-DE4B-95CE-6DB70DBA9567}" type="datetimeFigureOut">
               <a:rPr lang="en-US" dirty="0"/>
               <a:pPr/>
-              <a:t>30-Nov-15</a:t>
+              <a:t>02-Dec-15</a:t>
             </a:fld>
             <a:endParaRPr lang="en-US" dirty="0"/>
           </a:p>
@@ -5910,8 +5910,8 @@
         </p:blipFill>
         <p:spPr>
           <a:xfrm>
-            <a:off x="1141413" y="1981651"/>
-            <a:ext cx="2506291" cy="4455630"/>
+            <a:off x="1141413" y="1981652"/>
+            <a:ext cx="2506291" cy="4455628"/>
           </a:xfrm>
         </p:spPr>
       </p:pic>
@@ -5938,7 +5938,7 @@
         <p:spPr>
           <a:xfrm>
             <a:off x="4841266" y="1981651"/>
-            <a:ext cx="2506292" cy="4455630"/>
+            <a:ext cx="2506291" cy="4455630"/>
           </a:xfrm>
           <a:prstGeom prst="rect">
             <a:avLst/>
@@ -5967,8 +5967,8 @@
         </p:blipFill>
         <p:spPr>
           <a:xfrm>
-            <a:off x="8541120" y="1981651"/>
-            <a:ext cx="2506291" cy="4455630"/>
+            <a:off x="8541120" y="1981652"/>
+            <a:ext cx="2506291" cy="4455628"/>
           </a:xfrm>
           <a:prstGeom prst="rect">
             <a:avLst/>

</xml_diff>